<commit_message>
Update the scenario 4
</commit_message>
<xml_diff>
--- a/Articles/2_ShareLocalDeepSeekService/img/designDoc.pptx
+++ b/Articles/2_ShareLocalDeepSeekService/img/designDoc.pptx
@@ -199,7 +199,7 @@
           <a:p>
             <a:fld id="{C6840B1D-3402-45D4-96EF-7C4E997A65EA}" type="datetimeFigureOut">
               <a:rPr lang="en-SG" smtClean="0"/>
-              <a:t>1/3/2025</a:t>
+              <a:t>2/3/2025</a:t>
             </a:fld>
             <a:endParaRPr lang="en-SG"/>
           </a:p>
@@ -700,7 +700,7 @@
           <a:p>
             <a:fld id="{F2C2400D-C8F7-497A-9C72-B54206FA314E}" type="datetimeFigureOut">
               <a:rPr lang="en-SG" smtClean="0"/>
-              <a:t>1/3/2025</a:t>
+              <a:t>2/3/2025</a:t>
             </a:fld>
             <a:endParaRPr lang="en-SG"/>
           </a:p>
@@ -900,7 +900,7 @@
           <a:p>
             <a:fld id="{F2C2400D-C8F7-497A-9C72-B54206FA314E}" type="datetimeFigureOut">
               <a:rPr lang="en-SG" smtClean="0"/>
-              <a:t>1/3/2025</a:t>
+              <a:t>2/3/2025</a:t>
             </a:fld>
             <a:endParaRPr lang="en-SG"/>
           </a:p>
@@ -1110,7 +1110,7 @@
           <a:p>
             <a:fld id="{F2C2400D-C8F7-497A-9C72-B54206FA314E}" type="datetimeFigureOut">
               <a:rPr lang="en-SG" smtClean="0"/>
-              <a:t>1/3/2025</a:t>
+              <a:t>2/3/2025</a:t>
             </a:fld>
             <a:endParaRPr lang="en-SG"/>
           </a:p>
@@ -1310,7 +1310,7 @@
           <a:p>
             <a:fld id="{F2C2400D-C8F7-497A-9C72-B54206FA314E}" type="datetimeFigureOut">
               <a:rPr lang="en-SG" smtClean="0"/>
-              <a:t>1/3/2025</a:t>
+              <a:t>2/3/2025</a:t>
             </a:fld>
             <a:endParaRPr lang="en-SG"/>
           </a:p>
@@ -1586,7 +1586,7 @@
           <a:p>
             <a:fld id="{F2C2400D-C8F7-497A-9C72-B54206FA314E}" type="datetimeFigureOut">
               <a:rPr lang="en-SG" smtClean="0"/>
-              <a:t>1/3/2025</a:t>
+              <a:t>2/3/2025</a:t>
             </a:fld>
             <a:endParaRPr lang="en-SG"/>
           </a:p>
@@ -1854,7 +1854,7 @@
           <a:p>
             <a:fld id="{F2C2400D-C8F7-497A-9C72-B54206FA314E}" type="datetimeFigureOut">
               <a:rPr lang="en-SG" smtClean="0"/>
-              <a:t>1/3/2025</a:t>
+              <a:t>2/3/2025</a:t>
             </a:fld>
             <a:endParaRPr lang="en-SG"/>
           </a:p>
@@ -2269,7 +2269,7 @@
           <a:p>
             <a:fld id="{F2C2400D-C8F7-497A-9C72-B54206FA314E}" type="datetimeFigureOut">
               <a:rPr lang="en-SG" smtClean="0"/>
-              <a:t>1/3/2025</a:t>
+              <a:t>2/3/2025</a:t>
             </a:fld>
             <a:endParaRPr lang="en-SG"/>
           </a:p>
@@ -2411,7 +2411,7 @@
           <a:p>
             <a:fld id="{F2C2400D-C8F7-497A-9C72-B54206FA314E}" type="datetimeFigureOut">
               <a:rPr lang="en-SG" smtClean="0"/>
-              <a:t>1/3/2025</a:t>
+              <a:t>2/3/2025</a:t>
             </a:fld>
             <a:endParaRPr lang="en-SG"/>
           </a:p>
@@ -2524,7 +2524,7 @@
           <a:p>
             <a:fld id="{F2C2400D-C8F7-497A-9C72-B54206FA314E}" type="datetimeFigureOut">
               <a:rPr lang="en-SG" smtClean="0"/>
-              <a:t>1/3/2025</a:t>
+              <a:t>2/3/2025</a:t>
             </a:fld>
             <a:endParaRPr lang="en-SG"/>
           </a:p>
@@ -2837,7 +2837,7 @@
           <a:p>
             <a:fld id="{F2C2400D-C8F7-497A-9C72-B54206FA314E}" type="datetimeFigureOut">
               <a:rPr lang="en-SG" smtClean="0"/>
-              <a:t>1/3/2025</a:t>
+              <a:t>2/3/2025</a:t>
             </a:fld>
             <a:endParaRPr lang="en-SG"/>
           </a:p>
@@ -3126,7 +3126,7 @@
           <a:p>
             <a:fld id="{F2C2400D-C8F7-497A-9C72-B54206FA314E}" type="datetimeFigureOut">
               <a:rPr lang="en-SG" smtClean="0"/>
-              <a:t>1/3/2025</a:t>
+              <a:t>2/3/2025</a:t>
             </a:fld>
             <a:endParaRPr lang="en-SG"/>
           </a:p>
@@ -3369,7 +3369,7 @@
           <a:p>
             <a:fld id="{F2C2400D-C8F7-497A-9C72-B54206FA314E}" type="datetimeFigureOut">
               <a:rPr lang="en-SG" smtClean="0"/>
-              <a:t>1/3/2025</a:t>
+              <a:t>2/3/2025</a:t>
             </a:fld>
             <a:endParaRPr lang="en-SG"/>
           </a:p>
@@ -7186,10 +7186,10 @@
       </p:sp>
       <p:sp>
         <p:nvSpPr>
-          <p:cNvPr id="73" name="TextBox 72">
-            <a:extLst>
-              <a:ext uri="{FF2B5EF4-FFF2-40B4-BE49-F238E27FC236}">
-                <a16:creationId xmlns:a16="http://schemas.microsoft.com/office/drawing/2014/main" id="{A7AD0652-BF09-10F4-A4B6-C41F64C6D3B8}"/>
+          <p:cNvPr id="2" name="TextBox 1">
+            <a:extLst>
+              <a:ext uri="{FF2B5EF4-FFF2-40B4-BE49-F238E27FC236}">
+                <a16:creationId xmlns:a16="http://schemas.microsoft.com/office/drawing/2014/main" id="{09107CCB-3ED9-EF89-B712-010C3E16614E}"/>
               </a:ext>
             </a:extLst>
           </p:cNvPr>
@@ -7198,8 +7198,8 @@
         </p:nvSpPr>
         <p:spPr>
           <a:xfrm>
-            <a:off x="782048" y="1126817"/>
-            <a:ext cx="9479406" cy="584775"/>
+            <a:off x="915386" y="1229537"/>
+            <a:ext cx="9533361" cy="400110"/>
           </a:xfrm>
           <a:prstGeom prst="rect">
             <a:avLst/>
@@ -7213,16 +7213,10 @@
           <a:lstStyle/>
           <a:p>
             <a:r>
-              <a:rPr lang="en-US" sz="1600" b="1" dirty="0"/>
-              <a:t>Use Case Scenario-02: </a:t>
-            </a:r>
-          </a:p>
-          <a:p>
-            <a:r>
-              <a:rPr lang="en-US" sz="1600" b="1" dirty="0"/>
-              <a:t>Add different prompt in user’s question to generate the customized response for different users.</a:t>
-            </a:r>
-            <a:endParaRPr lang="en-SG" sz="1600" b="1" dirty="0"/>
+              <a:rPr lang="en-US" sz="2000" b="1" dirty="0"/>
+              <a:t>Use Case Scenario 02: Customized Query Handling Based on User Expertise</a:t>
+            </a:r>
+            <a:endParaRPr lang="en-SG" sz="2000" b="1" dirty="0"/>
           </a:p>
         </p:txBody>
       </p:sp>

</xml_diff>